<commit_message>
review and admin board has been changed
</commit_message>
<xml_diff>
--- a/fullstack1.pptx
+++ b/fullstack1.pptx
@@ -7,10 +7,10 @@
     <p:sldMasterId id="2147483673" r:id="rId3"/>
   </p:sldMasterIdLst>
   <p:notesMasterIdLst>
-    <p:notesMasterId r:id="rId13"/>
+    <p:notesMasterId r:id="rId14"/>
   </p:notesMasterIdLst>
   <p:handoutMasterIdLst>
-    <p:handoutMasterId r:id="rId14"/>
+    <p:handoutMasterId r:id="rId15"/>
   </p:handoutMasterIdLst>
   <p:sldIdLst>
     <p:sldId id="728" r:id="rId4"/>
@@ -19,9 +19,10 @@
     <p:sldId id="739" r:id="rId7"/>
     <p:sldId id="738" r:id="rId8"/>
     <p:sldId id="740" r:id="rId9"/>
-    <p:sldId id="741" r:id="rId10"/>
-    <p:sldId id="742" r:id="rId11"/>
-    <p:sldId id="725" r:id="rId12"/>
+    <p:sldId id="743" r:id="rId10"/>
+    <p:sldId id="741" r:id="rId11"/>
+    <p:sldId id="742" r:id="rId12"/>
+    <p:sldId id="725" r:id="rId13"/>
   </p:sldIdLst>
   <p:sldSz cx="9144000" cy="6858000" type="screen4x3"/>
   <p:notesSz cx="6811963" cy="9942513"/>
@@ -269,7 +270,7 @@
             </a:pPr>
             <a:fld id="{87A49BD9-C15B-4CCE-BA8B-28A7138E7D46}" type="datetime3">
               <a:rPr lang="en-US" smtClean="0"/>
-              <a:t>17 August 2025</a:t>
+              <a:t>18 August 2025</a:t>
             </a:fld>
             <a:endParaRPr lang="en-IN" dirty="0"/>
           </a:p>
@@ -471,7 +472,7 @@
             </a:pPr>
             <a:fld id="{745AF635-11AF-450F-B773-692E6CB212DF}" type="datetime3">
               <a:rPr lang="en-US" smtClean="0"/>
-              <a:t>17 August 2025</a:t>
+              <a:t>18 August 2025</a:t>
             </a:fld>
             <a:endParaRPr lang="en-US" dirty="0"/>
           </a:p>
@@ -1213,7 +1214,7 @@
             </a:pPr>
             <a:fld id="{868711EB-544A-4405-9B07-930EC371C035}" type="datetime5">
               <a:rPr lang="en-US" smtClean="0"/>
-              <a:t>17-Aug-25</a:t>
+              <a:t>18-Aug-25</a:t>
             </a:fld>
             <a:endParaRPr lang="en-US" dirty="0"/>
           </a:p>
@@ -1375,7 +1376,7 @@
             </a:pPr>
             <a:fld id="{0DA4E39E-479B-4003-953E-8F945459897C}" type="datetime5">
               <a:rPr lang="en-US" smtClean="0"/>
-              <a:t>17-Aug-25</a:t>
+              <a:t>18-Aug-25</a:t>
             </a:fld>
             <a:endParaRPr lang="en-US" dirty="0"/>
           </a:p>
@@ -1547,7 +1548,7 @@
             </a:pPr>
             <a:fld id="{1176DFE3-E17F-466C-8AC1-52E2468DF967}" type="datetime5">
               <a:rPr lang="en-US" smtClean="0"/>
-              <a:t>17-Aug-25</a:t>
+              <a:t>18-Aug-25</a:t>
             </a:fld>
             <a:endParaRPr lang="en-US" dirty="0"/>
           </a:p>
@@ -1654,7 +1655,7 @@
             </a:pPr>
             <a:fld id="{E9595922-CB65-4694-88E1-0389563862D8}" type="datetime5">
               <a:rPr lang="en-US" smtClean="0"/>
-              <a:t>17-Aug-25</a:t>
+              <a:t>18-Aug-25</a:t>
             </a:fld>
             <a:endParaRPr lang="en-US" dirty="0"/>
           </a:p>
@@ -1877,7 +1878,7 @@
           <a:p>
             <a:fld id="{34E9FD4F-3980-456F-B545-8D53309EA37E}" type="datetime5">
               <a:rPr lang="en-US" smtClean="0"/>
-              <a:t>17-Aug-25</a:t>
+              <a:t>18-Aug-25</a:t>
             </a:fld>
             <a:endParaRPr lang="en-US" dirty="0"/>
           </a:p>
@@ -2025,7 +2026,7 @@
           <a:p>
             <a:fld id="{D535EB8F-F371-4484-A84C-21A1B01158C7}" type="datetime5">
               <a:rPr lang="en-US" smtClean="0"/>
-              <a:t>17-Aug-25</a:t>
+              <a:t>18-Aug-25</a:t>
             </a:fld>
             <a:endParaRPr lang="en-US" dirty="0"/>
           </a:p>
@@ -2250,7 +2251,7 @@
           <a:p>
             <a:fld id="{D2C979A4-C0B2-4C81-A4FB-1E5B80AD0B49}" type="datetime5">
               <a:rPr lang="en-US" smtClean="0"/>
-              <a:t>17-Aug-25</a:t>
+              <a:t>18-Aug-25</a:t>
             </a:fld>
             <a:endParaRPr lang="en-US" dirty="0"/>
           </a:p>
@@ -2542,7 +2543,7 @@
           <a:p>
             <a:fld id="{3BDE2897-C65B-406D-A588-744D383CA7DE}" type="datetime5">
               <a:rPr lang="en-US" smtClean="0"/>
-              <a:t>17-Aug-25</a:t>
+              <a:t>18-Aug-25</a:t>
             </a:fld>
             <a:endParaRPr lang="en-US" dirty="0"/>
           </a:p>
@@ -2941,7 +2942,7 @@
           <a:p>
             <a:fld id="{973F1FA1-8458-4129-924B-7532EDD86147}" type="datetime5">
               <a:rPr lang="en-US" smtClean="0"/>
-              <a:t>17-Aug-25</a:t>
+              <a:t>18-Aug-25</a:t>
             </a:fld>
             <a:endParaRPr lang="en-US" dirty="0"/>
           </a:p>
@@ -3038,7 +3039,7 @@
           <a:p>
             <a:fld id="{445FE24D-4434-424D-9C75-6E46573DFD75}" type="datetime5">
               <a:rPr lang="en-US" smtClean="0"/>
-              <a:t>17-Aug-25</a:t>
+              <a:t>18-Aug-25</a:t>
             </a:fld>
             <a:endParaRPr lang="en-US" dirty="0"/>
           </a:p>
@@ -3113,7 +3114,7 @@
           <a:p>
             <a:fld id="{6A12F143-239B-42CE-BE0F-55E3CD594915}" type="datetime5">
               <a:rPr lang="en-US" smtClean="0"/>
-              <a:t>17-Aug-25</a:t>
+              <a:t>18-Aug-25</a:t>
             </a:fld>
             <a:endParaRPr lang="en-US" dirty="0"/>
           </a:p>
@@ -3268,7 +3269,7 @@
             </a:pPr>
             <a:fld id="{E1413D5B-0279-47B2-AB44-E806A00ECAC5}" type="datetime5">
               <a:rPr lang="en-US" smtClean="0"/>
-              <a:t>17-Aug-25</a:t>
+              <a:t>18-Aug-25</a:t>
             </a:fld>
             <a:endParaRPr lang="en-US" dirty="0"/>
           </a:p>
@@ -3530,7 +3531,7 @@
           <a:p>
             <a:fld id="{19EAD920-F682-4A55-B63F-48C8F1CC1283}" type="datetime5">
               <a:rPr lang="en-US" smtClean="0"/>
-              <a:t>17-Aug-25</a:t>
+              <a:t>18-Aug-25</a:t>
             </a:fld>
             <a:endParaRPr lang="en-US" dirty="0"/>
           </a:p>
@@ -3762,7 +3763,7 @@
           <a:p>
             <a:fld id="{8E917B04-B5F9-4630-A128-87B4B92EA18E}" type="datetime5">
               <a:rPr lang="en-US" smtClean="0"/>
-              <a:t>17-Aug-25</a:t>
+              <a:t>18-Aug-25</a:t>
             </a:fld>
             <a:endParaRPr lang="en-US" dirty="0"/>
           </a:p>
@@ -3910,7 +3911,7 @@
           <a:p>
             <a:fld id="{8E73A310-130A-439C-B3E5-0906939592AC}" type="datetime5">
               <a:rPr lang="en-US" smtClean="0"/>
-              <a:t>17-Aug-25</a:t>
+              <a:t>18-Aug-25</a:t>
             </a:fld>
             <a:endParaRPr lang="en-US" dirty="0"/>
           </a:p>
@@ -4068,7 +4069,7 @@
           <a:p>
             <a:fld id="{350FB05B-E5CC-4464-9BB7-7BCCF84A07E4}" type="datetime5">
               <a:rPr lang="en-US" smtClean="0"/>
-              <a:t>17-Aug-25</a:t>
+              <a:t>18-Aug-25</a:t>
             </a:fld>
             <a:endParaRPr lang="en-US" dirty="0"/>
           </a:p>
@@ -4261,7 +4262,7 @@
           <a:p>
             <a:fld id="{48A573B2-5186-4EA1-B709-D1438BA10970}" type="datetime5">
               <a:rPr lang="en-US" smtClean="0"/>
-              <a:t>17-Aug-25</a:t>
+              <a:t>18-Aug-25</a:t>
             </a:fld>
             <a:endParaRPr lang="en-US" dirty="0"/>
           </a:p>
@@ -4409,7 +4410,7 @@
           <a:p>
             <a:fld id="{BDE5369F-A3ED-4071-A75D-258CD23F1EC5}" type="datetime5">
               <a:rPr lang="en-US" smtClean="0"/>
-              <a:t>17-Aug-25</a:t>
+              <a:t>18-Aug-25</a:t>
             </a:fld>
             <a:endParaRPr lang="en-US" dirty="0"/>
           </a:p>
@@ -4634,7 +4635,7 @@
           <a:p>
             <a:fld id="{1DE2E41D-AD20-4582-96A9-26AE005D4E42}" type="datetime5">
               <a:rPr lang="en-US" smtClean="0"/>
-              <a:t>17-Aug-25</a:t>
+              <a:t>18-Aug-25</a:t>
             </a:fld>
             <a:endParaRPr lang="en-US" dirty="0"/>
           </a:p>
@@ -4899,7 +4900,7 @@
           <a:p>
             <a:fld id="{6EA145C0-2AC4-4702-9C85-BED29F3D5C77}" type="datetime5">
               <a:rPr lang="en-US" smtClean="0"/>
-              <a:t>17-Aug-25</a:t>
+              <a:t>18-Aug-25</a:t>
             </a:fld>
             <a:endParaRPr lang="en-US" dirty="0"/>
           </a:p>
@@ -5298,7 +5299,7 @@
           <a:p>
             <a:fld id="{93198E6B-3CEE-468F-BE48-CC50E9D8E64E}" type="datetime5">
               <a:rPr lang="en-US" smtClean="0"/>
-              <a:t>17-Aug-25</a:t>
+              <a:t>18-Aug-25</a:t>
             </a:fld>
             <a:endParaRPr lang="en-US" dirty="0"/>
           </a:p>
@@ -5395,7 +5396,7 @@
           <a:p>
             <a:fld id="{52FACE50-1432-4FE3-B49C-8A04528B6EFC}" type="datetime5">
               <a:rPr lang="en-US" smtClean="0"/>
-              <a:t>17-Aug-25</a:t>
+              <a:t>18-Aug-25</a:t>
             </a:fld>
             <a:endParaRPr lang="en-US" dirty="0"/>
           </a:p>
@@ -5623,7 +5624,7 @@
             </a:pPr>
             <a:fld id="{BEE568E9-B9E9-4171-B614-6B8CD7508211}" type="datetime5">
               <a:rPr lang="en-US" smtClean="0"/>
-              <a:t>17-Aug-25</a:t>
+              <a:t>18-Aug-25</a:t>
             </a:fld>
             <a:endParaRPr lang="en-US" dirty="0"/>
           </a:p>
@@ -5705,7 +5706,7 @@
           <a:p>
             <a:fld id="{65E331A2-936F-4415-B2A7-7A973F13EE44}" type="datetime5">
               <a:rPr lang="en-US" smtClean="0"/>
-              <a:t>17-Aug-25</a:t>
+              <a:t>18-Aug-25</a:t>
             </a:fld>
             <a:endParaRPr lang="en-US" dirty="0"/>
           </a:p>
@@ -5960,7 +5961,7 @@
           <a:p>
             <a:fld id="{966FD456-933D-482B-A38F-44A2D1FBACCD}" type="datetime5">
               <a:rPr lang="en-US" smtClean="0"/>
-              <a:t>17-Aug-25</a:t>
+              <a:t>18-Aug-25</a:t>
             </a:fld>
             <a:endParaRPr lang="en-US" dirty="0"/>
           </a:p>
@@ -6192,7 +6193,7 @@
           <a:p>
             <a:fld id="{F2665F44-41B5-44CF-9451-A8CFAFD511C5}" type="datetime5">
               <a:rPr lang="en-US" smtClean="0"/>
-              <a:t>17-Aug-25</a:t>
+              <a:t>18-Aug-25</a:t>
             </a:fld>
             <a:endParaRPr lang="en-US" dirty="0"/>
           </a:p>
@@ -6340,7 +6341,7 @@
           <a:p>
             <a:fld id="{6620F398-5194-4922-94CC-66A368E58A46}" type="datetime5">
               <a:rPr lang="en-US" smtClean="0"/>
-              <a:t>17-Aug-25</a:t>
+              <a:t>18-Aug-25</a:t>
             </a:fld>
             <a:endParaRPr lang="en-US" dirty="0"/>
           </a:p>
@@ -6498,7 +6499,7 @@
           <a:p>
             <a:fld id="{44DA51E7-B80F-47BE-909C-C69C302A4ACA}" type="datetime5">
               <a:rPr lang="en-US" smtClean="0"/>
-              <a:t>17-Aug-25</a:t>
+              <a:t>18-Aug-25</a:t>
             </a:fld>
             <a:endParaRPr lang="en-US" dirty="0"/>
           </a:p>
@@ -6751,7 +6752,7 @@
             </a:pPr>
             <a:fld id="{089F4348-0461-4A32-B5EC-44A54333EEB4}" type="datetime5">
               <a:rPr lang="en-US" smtClean="0"/>
-              <a:t>17-Aug-25</a:t>
+              <a:t>18-Aug-25</a:t>
             </a:fld>
             <a:endParaRPr lang="en-US" dirty="0"/>
           </a:p>
@@ -7125,7 +7126,7 @@
             </a:pPr>
             <a:fld id="{FAE54709-D76C-492B-9E83-DA5CE41081DB}" type="datetime5">
               <a:rPr lang="en-US" smtClean="0"/>
-              <a:t>17-Aug-25</a:t>
+              <a:t>18-Aug-25</a:t>
             </a:fld>
             <a:endParaRPr lang="en-US" dirty="0"/>
           </a:p>
@@ -7273,7 +7274,7 @@
             </a:pPr>
             <a:fld id="{5105A5D3-A5C5-41BC-AC1B-78376003971C}" type="datetime5">
               <a:rPr lang="en-US" smtClean="0"/>
-              <a:t>17-Aug-25</a:t>
+              <a:t>18-Aug-25</a:t>
             </a:fld>
             <a:endParaRPr lang="en-US" dirty="0"/>
           </a:p>
@@ -7362,7 +7363,7 @@
             </a:pPr>
             <a:fld id="{28EA4A47-561E-465A-A6B1-ADF332ABEB53}" type="datetime5">
               <a:rPr lang="en-US" smtClean="0"/>
-              <a:t>17-Aug-25</a:t>
+              <a:t>18-Aug-25</a:t>
             </a:fld>
             <a:endParaRPr lang="en-US" dirty="0"/>
           </a:p>
@@ -7620,7 +7621,7 @@
             </a:pPr>
             <a:fld id="{C4629B9D-76A3-483C-9F6A-540A7409809D}" type="datetime5">
               <a:rPr lang="en-US" smtClean="0"/>
-              <a:t>17-Aug-25</a:t>
+              <a:t>18-Aug-25</a:t>
             </a:fld>
             <a:endParaRPr lang="en-US" dirty="0"/>
           </a:p>
@@ -8230,7 +8231,7 @@
             </a:pPr>
             <a:fld id="{63AE52A7-64DF-4833-A86F-A3F47E2AC27C}" type="datetime5">
               <a:rPr lang="en-US" smtClean="0"/>
-              <a:t>17-Aug-25</a:t>
+              <a:t>18-Aug-25</a:t>
             </a:fld>
             <a:endParaRPr lang="en-US" dirty="0"/>
           </a:p>
@@ -8451,7 +8452,7 @@
             </a:pPr>
             <a:fld id="{F9D6E878-1374-43BF-9C46-281CCE7F38C1}" type="datetime5">
               <a:rPr lang="en-US" smtClean="0"/>
-              <a:t>17-Aug-25</a:t>
+              <a:t>18-Aug-25</a:t>
             </a:fld>
             <a:endParaRPr lang="en-US" dirty="0"/>
           </a:p>
@@ -9022,7 +9023,7 @@
           <a:p>
             <a:fld id="{6AAB0F85-54C5-4371-92E9-C441160297C0}" type="datetime5">
               <a:rPr lang="en-US" smtClean="0"/>
-              <a:t>17-Aug-25</a:t>
+              <a:t>18-Aug-25</a:t>
             </a:fld>
             <a:endParaRPr lang="en-US" dirty="0"/>
           </a:p>
@@ -9448,7 +9449,7 @@
           <a:p>
             <a:fld id="{AF1A4985-C20B-43A0-A3C8-38EB8430E818}" type="datetime5">
               <a:rPr lang="en-US" smtClean="0"/>
-              <a:t>17-Aug-25</a:t>
+              <a:t>18-Aug-25</a:t>
             </a:fld>
             <a:endParaRPr lang="en-US" dirty="0"/>
           </a:p>
@@ -9937,8 +9938,8 @@
         </p:nvSpPr>
         <p:spPr>
           <a:xfrm>
-            <a:off x="323528" y="85116"/>
-            <a:ext cx="7992888" cy="1646605"/>
+            <a:off x="683568" y="126211"/>
+            <a:ext cx="7992888" cy="2200602"/>
           </a:xfrm>
           <a:prstGeom prst="rect">
             <a:avLst/>
@@ -10079,9 +10080,52 @@
               </a:rPr>
               <a:t>Full Stack REV-1</a:t>
             </a:r>
+          </a:p>
+          <a:p>
+            <a:pPr algn="ctr"/>
+            <a:endParaRPr lang="en-US" b="1" dirty="0">
+              <a:ln w="0"/>
+              <a:solidFill>
+                <a:srgbClr val="FF0000"/>
+              </a:solidFill>
+              <a:effectLst>
+                <a:outerShdw blurRad="38100" dist="25400" dir="5400000" algn="ctr" rotWithShape="0">
+                  <a:srgbClr val="6E747A">
+                    <a:alpha val="43000"/>
+                  </a:srgbClr>
+                </a:outerShdw>
+              </a:effectLst>
+              <a:latin typeface="Times New Roman" panose="02020603050405020304" pitchFamily="18" charset="0"/>
+              <a:cs typeface="Times New Roman" panose="02020603050405020304" pitchFamily="18" charset="0"/>
+            </a:endParaRPr>
+          </a:p>
+          <a:p>
+            <a:pPr algn="ctr"/>
+            <a:r>
+              <a:rPr lang="en-US" b="1" dirty="0">
+                <a:ln w="0"/>
+                <a:solidFill>
+                  <a:schemeClr val="accent1">
+                    <a:lumMod val="75000"/>
+                  </a:schemeClr>
+                </a:solidFill>
+                <a:effectLst>
+                  <a:outerShdw blurRad="38100" dist="25400" dir="5400000" algn="ctr" rotWithShape="0">
+                    <a:srgbClr val="6E747A">
+                      <a:alpha val="43000"/>
+                    </a:srgbClr>
+                  </a:outerShdw>
+                </a:effectLst>
+                <a:latin typeface="Times New Roman" panose="02020603050405020304" pitchFamily="18" charset="0"/>
+                <a:cs typeface="Times New Roman" panose="02020603050405020304" pitchFamily="18" charset="0"/>
+              </a:rPr>
+              <a:t>FOOD ORDERING SYSTEM</a:t>
+            </a:r>
             <a:endParaRPr lang="en-IN" dirty="0">
               <a:solidFill>
-                <a:srgbClr val="FF0000"/>
+                <a:schemeClr val="accent1">
+                  <a:lumMod val="75000"/>
+                </a:schemeClr>
               </a:solidFill>
               <a:latin typeface="Times New Roman" panose="02020603050405020304" pitchFamily="18" charset="0"/>
               <a:cs typeface="Times New Roman" panose="02020603050405020304" pitchFamily="18" charset="0"/>
@@ -10103,8 +10147,8 @@
         </p:nvSpPr>
         <p:spPr>
           <a:xfrm>
-            <a:off x="827584" y="1914197"/>
-            <a:ext cx="5994813" cy="2154436"/>
+            <a:off x="827584" y="2437725"/>
+            <a:ext cx="5994813" cy="2431435"/>
           </a:xfrm>
           <a:prstGeom prst="rect">
             <a:avLst/>
@@ -10218,8 +10262,23 @@
                 <a:ea typeface="Cambria" panose="02040503050406030204" pitchFamily="18" charset="0"/>
                 <a:cs typeface="Times New Roman" panose="02020603050405020304" pitchFamily="18" charset="0"/>
               </a:rPr>
-              <a:t>                Mr</a:t>
-            </a:r>
+              <a:t>                </a:t>
+            </a:r>
+            <a:r>
+              <a:rPr lang="en-IN" altLang="en-US" b="1" dirty="0" err="1">
+                <a:latin typeface="Times New Roman" panose="02020603050405020304" pitchFamily="18" charset="0"/>
+                <a:ea typeface="Cambria" panose="02040503050406030204" pitchFamily="18" charset="0"/>
+                <a:cs typeface="Times New Roman" panose="02020603050405020304" pitchFamily="18" charset="0"/>
+              </a:rPr>
+              <a:t>Mr.N.Vigneshwaran</a:t>
+            </a:r>
+            <a:endParaRPr lang="en-IN" altLang="en-US" b="1" dirty="0">
+              <a:latin typeface="Times New Roman" panose="02020603050405020304" pitchFamily="18" charset="0"/>
+              <a:ea typeface="Cambria" panose="02040503050406030204" pitchFamily="18" charset="0"/>
+              <a:cs typeface="Times New Roman" panose="02020603050405020304" pitchFamily="18" charset="0"/>
+            </a:endParaRPr>
+          </a:p>
+          <a:p>
             <a:endParaRPr lang="en-US" b="1" dirty="0">
               <a:latin typeface="Times New Roman" panose="02020603050405020304" pitchFamily="18" charset="0"/>
               <a:ea typeface="Cambria" panose="02040503050406030204" pitchFamily="18" charset="0"/>
@@ -10228,6 +10287,129 @@
           </a:p>
         </p:txBody>
       </p:sp>
+    </p:spTree>
+  </p:cSld>
+  <p:clrMapOvr>
+    <a:masterClrMapping/>
+  </p:clrMapOvr>
+</p:sld>
+</file>
+
+<file path=ppt/slides/slide10.xml><?xml version="1.0" encoding="utf-8"?>
+<p:sld xmlns:a="http://schemas.openxmlformats.org/drawingml/2006/main" xmlns:r="http://schemas.openxmlformats.org/officeDocument/2006/relationships" xmlns:p="http://schemas.openxmlformats.org/presentationml/2006/main">
+  <p:cSld>
+    <p:spTree>
+      <p:nvGrpSpPr>
+        <p:cNvPr id="1" name=""/>
+        <p:cNvGrpSpPr/>
+        <p:nvPr/>
+      </p:nvGrpSpPr>
+      <p:grpSpPr>
+        <a:xfrm>
+          <a:off x="0" y="0"/>
+          <a:ext cx="0" cy="0"/>
+          <a:chOff x="0" y="0"/>
+          <a:chExt cx="0" cy="0"/>
+        </a:xfrm>
+      </p:grpSpPr>
+      <p:sp>
+        <p:nvSpPr>
+          <p:cNvPr id="3" name="Content Placeholder 2"/>
+          <p:cNvSpPr>
+            <a:spLocks noGrp="1"/>
+          </p:cNvSpPr>
+          <p:nvPr>
+            <p:ph idx="1"/>
+          </p:nvPr>
+        </p:nvSpPr>
+        <p:spPr>
+          <a:xfrm>
+            <a:off x="899592" y="2708920"/>
+            <a:ext cx="7787208" cy="1152128"/>
+          </a:xfrm>
+        </p:spPr>
+        <p:txBody>
+          <a:bodyPr/>
+          <a:lstStyle/>
+          <a:p>
+            <a:pPr marL="0" indent="0" algn="ctr">
+              <a:buNone/>
+            </a:pPr>
+            <a:r>
+              <a:rPr lang="en-IN" sz="6600" b="1" dirty="0">
+                <a:solidFill>
+                  <a:schemeClr val="accent1">
+                    <a:lumMod val="75000"/>
+                  </a:schemeClr>
+                </a:solidFill>
+                <a:latin typeface="Times New Roman" panose="02020603050405020304" pitchFamily="18" charset="0"/>
+                <a:ea typeface="Cambria" panose="02040503050406030204" pitchFamily="18" charset="0"/>
+                <a:cs typeface="Times New Roman" panose="02020603050405020304" pitchFamily="18" charset="0"/>
+              </a:rPr>
+              <a:t>Thank You !!</a:t>
+            </a:r>
+            <a:endParaRPr lang="en-US" sz="6600" b="1" dirty="0">
+              <a:solidFill>
+                <a:schemeClr val="accent1">
+                  <a:lumMod val="75000"/>
+                </a:schemeClr>
+              </a:solidFill>
+              <a:latin typeface="Times New Roman" panose="02020603050405020304" pitchFamily="18" charset="0"/>
+              <a:cs typeface="Times New Roman" panose="02020603050405020304" pitchFamily="18" charset="0"/>
+            </a:endParaRPr>
+          </a:p>
+        </p:txBody>
+      </p:sp>
+      <p:sp>
+        <p:nvSpPr>
+          <p:cNvPr id="4" name="Date Placeholder 3"/>
+          <p:cNvSpPr>
+            <a:spLocks noGrp="1"/>
+          </p:cNvSpPr>
+          <p:nvPr>
+            <p:ph type="dt" sz="half" idx="10"/>
+          </p:nvPr>
+        </p:nvSpPr>
+        <p:spPr/>
+        <p:txBody>
+          <a:bodyPr/>
+          <a:lstStyle/>
+          <a:p>
+            <a:pPr>
+              <a:defRPr/>
+            </a:pPr>
+            <a:fld id="{E1413D5B-0279-47B2-AB44-E806A00ECAC5}" type="datetime5">
+              <a:rPr lang="en-US" smtClean="0"/>
+              <a:t>18-Aug-25</a:t>
+            </a:fld>
+            <a:endParaRPr lang="en-US" dirty="0"/>
+          </a:p>
+        </p:txBody>
+      </p:sp>
+      <p:pic>
+        <p:nvPicPr>
+          <p:cNvPr id="5" name="Picture 4" descr="kec2blackborder png.PNG"/>
+          <p:cNvPicPr>
+            <a:picLocks noChangeAspect="1"/>
+          </p:cNvPicPr>
+          <p:nvPr/>
+        </p:nvPicPr>
+        <p:blipFill>
+          <a:blip r:embed="rId2" cstate="print"/>
+          <a:stretch>
+            <a:fillRect/>
+          </a:stretch>
+        </p:blipFill>
+        <p:spPr>
+          <a:xfrm>
+            <a:off x="0" y="52612"/>
+            <a:ext cx="508210" cy="632726"/>
+          </a:xfrm>
+          <a:prstGeom prst="rect">
+            <a:avLst/>
+          </a:prstGeom>
+        </p:spPr>
+      </p:pic>
     </p:spTree>
   </p:cSld>
   <p:clrMapOvr>
@@ -10884,7 +11066,7 @@
             </a:pPr>
             <a:fld id="{E1413D5B-0279-47B2-AB44-E806A00ECAC5}" type="datetime5">
               <a:rPr lang="en-US" smtClean="0"/>
-              <a:t>17-Aug-25</a:t>
+              <a:t>18-Aug-25</a:t>
             </a:fld>
             <a:endParaRPr lang="en-US" dirty="0"/>
           </a:p>
@@ -10922,56 +11104,6 @@
       </p:grpSpPr>
       <p:sp>
         <p:nvSpPr>
-          <p:cNvPr id="2" name="Title 1">
-            <a:extLst>
-              <a:ext uri="{FF2B5EF4-FFF2-40B4-BE49-F238E27FC236}">
-                <a16:creationId xmlns:a16="http://schemas.microsoft.com/office/drawing/2014/main" id="{419C88DD-1B7D-9290-BFAA-EAC7B8C93047}"/>
-              </a:ext>
-            </a:extLst>
-          </p:cNvPr>
-          <p:cNvSpPr>
-            <a:spLocks noGrp="1"/>
-          </p:cNvSpPr>
-          <p:nvPr>
-            <p:ph type="title"/>
-          </p:nvPr>
-        </p:nvSpPr>
-        <p:spPr/>
-        <p:txBody>
-          <a:bodyPr/>
-          <a:lstStyle/>
-          <a:p>
-            <a:endParaRPr lang="en-IN"/>
-          </a:p>
-        </p:txBody>
-      </p:sp>
-      <p:sp>
-        <p:nvSpPr>
-          <p:cNvPr id="3" name="Content Placeholder 2">
-            <a:extLst>
-              <a:ext uri="{FF2B5EF4-FFF2-40B4-BE49-F238E27FC236}">
-                <a16:creationId xmlns:a16="http://schemas.microsoft.com/office/drawing/2014/main" id="{CDABAC1A-2445-C71D-5DC5-7B91C4A8AFB8}"/>
-              </a:ext>
-            </a:extLst>
-          </p:cNvPr>
-          <p:cNvSpPr>
-            <a:spLocks noGrp="1"/>
-          </p:cNvSpPr>
-          <p:nvPr>
-            <p:ph idx="1"/>
-          </p:nvPr>
-        </p:nvSpPr>
-        <p:spPr/>
-        <p:txBody>
-          <a:bodyPr/>
-          <a:lstStyle/>
-          <a:p>
-            <a:endParaRPr lang="en-IN"/>
-          </a:p>
-        </p:txBody>
-      </p:sp>
-      <p:sp>
-        <p:nvSpPr>
           <p:cNvPr id="4" name="Date Placeholder 3">
             <a:extLst>
               <a:ext uri="{FF2B5EF4-FFF2-40B4-BE49-F238E27FC236}">
@@ -10996,9 +11128,612 @@
             </a:pPr>
             <a:fld id="{E1413D5B-0279-47B2-AB44-E806A00ECAC5}" type="datetime5">
               <a:rPr lang="en-US" smtClean="0"/>
-              <a:t>17-Aug-25</a:t>
+              <a:t>18-Aug-25</a:t>
             </a:fld>
             <a:endParaRPr lang="en-US" dirty="0"/>
+          </a:p>
+        </p:txBody>
+      </p:sp>
+      <p:sp>
+        <p:nvSpPr>
+          <p:cNvPr id="9" name="Rectangle: Rounded Corners 8">
+            <a:extLst>
+              <a:ext uri="{FF2B5EF4-FFF2-40B4-BE49-F238E27FC236}">
+                <a16:creationId xmlns:a16="http://schemas.microsoft.com/office/drawing/2014/main" id="{511928D1-52D8-42E1-1966-CB632B9E9C47}"/>
+              </a:ext>
+            </a:extLst>
+          </p:cNvPr>
+          <p:cNvSpPr/>
+          <p:nvPr/>
+        </p:nvSpPr>
+        <p:spPr>
+          <a:xfrm>
+            <a:off x="6487465" y="2697805"/>
+            <a:ext cx="1360391" cy="990601"/>
+          </a:xfrm>
+          <a:prstGeom prst="roundRect">
+            <a:avLst/>
+          </a:prstGeom>
+        </p:spPr>
+        <p:style>
+          <a:lnRef idx="0">
+            <a:schemeClr val="accent1"/>
+          </a:lnRef>
+          <a:fillRef idx="3">
+            <a:schemeClr val="accent1"/>
+          </a:fillRef>
+          <a:effectRef idx="3">
+            <a:schemeClr val="accent1"/>
+          </a:effectRef>
+          <a:fontRef idx="minor">
+            <a:schemeClr val="lt1"/>
+          </a:fontRef>
+        </p:style>
+        <p:txBody>
+          <a:bodyPr rtlCol="0" anchor="ctr"/>
+          <a:lstStyle/>
+          <a:p>
+            <a:pPr algn="ctr"/>
+            <a:r>
+              <a:rPr lang="en-US" dirty="0"/>
+              <a:t>D</a:t>
+            </a:r>
+            <a:r>
+              <a:rPr lang="en-IN" dirty="0" err="1"/>
+              <a:t>atabase</a:t>
+            </a:r>
+            <a:endParaRPr lang="en-IN" dirty="0"/>
+          </a:p>
+          <a:p>
+            <a:pPr algn="ctr"/>
+            <a:r>
+              <a:rPr lang="en-IN" sz="1200" dirty="0"/>
+              <a:t>MongoDB</a:t>
+            </a:r>
+          </a:p>
+        </p:txBody>
+      </p:sp>
+      <p:sp>
+        <p:nvSpPr>
+          <p:cNvPr id="10" name="Rectangle: Rounded Corners 9">
+            <a:extLst>
+              <a:ext uri="{FF2B5EF4-FFF2-40B4-BE49-F238E27FC236}">
+                <a16:creationId xmlns:a16="http://schemas.microsoft.com/office/drawing/2014/main" id="{3D461E91-2377-63E6-0DED-57A42BCD9687}"/>
+              </a:ext>
+            </a:extLst>
+          </p:cNvPr>
+          <p:cNvSpPr/>
+          <p:nvPr/>
+        </p:nvSpPr>
+        <p:spPr>
+          <a:xfrm>
+            <a:off x="3779913" y="2684172"/>
+            <a:ext cx="1448544" cy="976967"/>
+          </a:xfrm>
+          <a:prstGeom prst="roundRect">
+            <a:avLst/>
+          </a:prstGeom>
+        </p:spPr>
+        <p:style>
+          <a:lnRef idx="0">
+            <a:schemeClr val="accent1"/>
+          </a:lnRef>
+          <a:fillRef idx="3">
+            <a:schemeClr val="accent1"/>
+          </a:fillRef>
+          <a:effectRef idx="3">
+            <a:schemeClr val="accent1"/>
+          </a:effectRef>
+          <a:fontRef idx="minor">
+            <a:schemeClr val="lt1"/>
+          </a:fontRef>
+        </p:style>
+        <p:txBody>
+          <a:bodyPr rtlCol="0" anchor="ctr"/>
+          <a:lstStyle/>
+          <a:p>
+            <a:pPr algn="ctr"/>
+            <a:r>
+              <a:rPr lang="en-US" dirty="0"/>
+              <a:t>Backend </a:t>
+            </a:r>
+          </a:p>
+          <a:p>
+            <a:pPr algn="ctr"/>
+            <a:r>
+              <a:rPr lang="en-IN" sz="1200" dirty="0"/>
+              <a:t>Node.js</a:t>
+            </a:r>
+          </a:p>
+          <a:p>
+            <a:pPr algn="ctr"/>
+            <a:r>
+              <a:rPr lang="en-IN" sz="1200" dirty="0"/>
+              <a:t>Express.js</a:t>
+            </a:r>
+          </a:p>
+        </p:txBody>
+      </p:sp>
+      <p:sp>
+        <p:nvSpPr>
+          <p:cNvPr id="11" name="Rectangle: Rounded Corners 10">
+            <a:extLst>
+              <a:ext uri="{FF2B5EF4-FFF2-40B4-BE49-F238E27FC236}">
+                <a16:creationId xmlns:a16="http://schemas.microsoft.com/office/drawing/2014/main" id="{EA67EBF8-DAE7-B9B4-DE67-55A53D1BE81B}"/>
+              </a:ext>
+            </a:extLst>
+          </p:cNvPr>
+          <p:cNvSpPr/>
+          <p:nvPr/>
+        </p:nvSpPr>
+        <p:spPr>
+          <a:xfrm>
+            <a:off x="1259632" y="2684172"/>
+            <a:ext cx="1331168" cy="990601"/>
+          </a:xfrm>
+          <a:prstGeom prst="roundRect">
+            <a:avLst/>
+          </a:prstGeom>
+        </p:spPr>
+        <p:style>
+          <a:lnRef idx="0">
+            <a:schemeClr val="accent1"/>
+          </a:lnRef>
+          <a:fillRef idx="3">
+            <a:schemeClr val="accent1"/>
+          </a:fillRef>
+          <a:effectRef idx="3">
+            <a:schemeClr val="accent1"/>
+          </a:effectRef>
+          <a:fontRef idx="minor">
+            <a:schemeClr val="lt1"/>
+          </a:fontRef>
+        </p:style>
+        <p:txBody>
+          <a:bodyPr rtlCol="0" anchor="ctr"/>
+          <a:lstStyle/>
+          <a:p>
+            <a:pPr algn="ctr"/>
+            <a:r>
+              <a:rPr lang="en-US" dirty="0"/>
+              <a:t>Frontend</a:t>
+            </a:r>
+          </a:p>
+          <a:p>
+            <a:pPr algn="ctr"/>
+            <a:r>
+              <a:rPr lang="en-US" sz="1200" dirty="0"/>
+              <a:t>React.js</a:t>
+            </a:r>
+            <a:endParaRPr lang="en-IN" sz="1200" dirty="0"/>
+          </a:p>
+        </p:txBody>
+      </p:sp>
+      <p:cxnSp>
+        <p:nvCxnSpPr>
+          <p:cNvPr id="15" name="Straight Arrow Connector 14">
+            <a:extLst>
+              <a:ext uri="{FF2B5EF4-FFF2-40B4-BE49-F238E27FC236}">
+                <a16:creationId xmlns:a16="http://schemas.microsoft.com/office/drawing/2014/main" id="{A35DDF41-AFB7-6298-7CE7-5422967C8D58}"/>
+              </a:ext>
+            </a:extLst>
+          </p:cNvPr>
+          <p:cNvCxnSpPr>
+            <a:cxnSpLocks/>
+            <a:stCxn id="11" idx="3"/>
+            <a:endCxn id="10" idx="1"/>
+          </p:cNvCxnSpPr>
+          <p:nvPr/>
+        </p:nvCxnSpPr>
+        <p:spPr>
+          <a:xfrm flipV="1">
+            <a:off x="2590800" y="3172656"/>
+            <a:ext cx="1189113" cy="6817"/>
+          </a:xfrm>
+          <a:prstGeom prst="straightConnector1">
+            <a:avLst/>
+          </a:prstGeom>
+          <a:ln>
+            <a:tailEnd type="triangle"/>
+          </a:ln>
+        </p:spPr>
+        <p:style>
+          <a:lnRef idx="3">
+            <a:schemeClr val="accent2"/>
+          </a:lnRef>
+          <a:fillRef idx="0">
+            <a:schemeClr val="accent2"/>
+          </a:fillRef>
+          <a:effectRef idx="2">
+            <a:schemeClr val="accent2"/>
+          </a:effectRef>
+          <a:fontRef idx="minor">
+            <a:schemeClr val="tx1"/>
+          </a:fontRef>
+        </p:style>
+      </p:cxnSp>
+      <p:cxnSp>
+        <p:nvCxnSpPr>
+          <p:cNvPr id="26" name="Straight Arrow Connector 25">
+            <a:extLst>
+              <a:ext uri="{FF2B5EF4-FFF2-40B4-BE49-F238E27FC236}">
+                <a16:creationId xmlns:a16="http://schemas.microsoft.com/office/drawing/2014/main" id="{8245D3DD-E87D-A8CE-6C3E-47355CCC80D1}"/>
+              </a:ext>
+            </a:extLst>
+          </p:cNvPr>
+          <p:cNvCxnSpPr>
+            <a:cxnSpLocks/>
+            <a:stCxn id="10" idx="3"/>
+          </p:cNvCxnSpPr>
+          <p:nvPr/>
+        </p:nvCxnSpPr>
+        <p:spPr>
+          <a:xfrm>
+            <a:off x="5228457" y="3172656"/>
+            <a:ext cx="1235465" cy="20449"/>
+          </a:xfrm>
+          <a:prstGeom prst="straightConnector1">
+            <a:avLst/>
+          </a:prstGeom>
+          <a:ln>
+            <a:tailEnd type="triangle"/>
+          </a:ln>
+        </p:spPr>
+        <p:style>
+          <a:lnRef idx="3">
+            <a:schemeClr val="accent2"/>
+          </a:lnRef>
+          <a:fillRef idx="0">
+            <a:schemeClr val="accent2"/>
+          </a:fillRef>
+          <a:effectRef idx="2">
+            <a:schemeClr val="accent2"/>
+          </a:effectRef>
+          <a:fontRef idx="minor">
+            <a:schemeClr val="tx1"/>
+          </a:fontRef>
+        </p:style>
+      </p:cxnSp>
+      <p:sp>
+        <p:nvSpPr>
+          <p:cNvPr id="20" name="TextBox 19">
+            <a:extLst>
+              <a:ext uri="{FF2B5EF4-FFF2-40B4-BE49-F238E27FC236}">
+                <a16:creationId xmlns:a16="http://schemas.microsoft.com/office/drawing/2014/main" id="{8F7D6A3E-3917-5294-BCD5-6657D6589DCE}"/>
+              </a:ext>
+            </a:extLst>
+          </p:cNvPr>
+          <p:cNvSpPr txBox="1"/>
+          <p:nvPr/>
+        </p:nvSpPr>
+        <p:spPr>
+          <a:xfrm>
+            <a:off x="3275856" y="332656"/>
+            <a:ext cx="4572000" cy="707886"/>
+          </a:xfrm>
+          <a:prstGeom prst="rect">
+            <a:avLst/>
+          </a:prstGeom>
+          <a:noFill/>
+        </p:spPr>
+        <p:txBody>
+          <a:bodyPr wrap="square">
+            <a:spAutoFit/>
+          </a:bodyPr>
+          <a:lstStyle/>
+          <a:p>
+            <a:r>
+              <a:rPr lang="en-US" sz="4000" dirty="0">
+                <a:solidFill>
+                  <a:srgbClr val="0000FF"/>
+                </a:solidFill>
+              </a:rPr>
+              <a:t>Architecture</a:t>
+            </a:r>
+            <a:endParaRPr lang="en-IN" sz="4000" dirty="0">
+              <a:solidFill>
+                <a:srgbClr val="0000FF"/>
+              </a:solidFill>
+            </a:endParaRPr>
+          </a:p>
+        </p:txBody>
+      </p:sp>
+      <p:sp>
+        <p:nvSpPr>
+          <p:cNvPr id="51" name="Rectangle: Rounded Corners 50">
+            <a:extLst>
+              <a:ext uri="{FF2B5EF4-FFF2-40B4-BE49-F238E27FC236}">
+                <a16:creationId xmlns:a16="http://schemas.microsoft.com/office/drawing/2014/main" id="{3E0FEEC6-89A2-095F-B395-19A71023D1F0}"/>
+              </a:ext>
+            </a:extLst>
+          </p:cNvPr>
+          <p:cNvSpPr/>
+          <p:nvPr/>
+        </p:nvSpPr>
+        <p:spPr>
+          <a:xfrm>
+            <a:off x="2267744" y="1730558"/>
+            <a:ext cx="1958486" cy="549574"/>
+          </a:xfrm>
+          <a:prstGeom prst="roundRect">
+            <a:avLst/>
+          </a:prstGeom>
+        </p:spPr>
+        <p:style>
+          <a:lnRef idx="2">
+            <a:schemeClr val="accent4"/>
+          </a:lnRef>
+          <a:fillRef idx="1">
+            <a:schemeClr val="lt1"/>
+          </a:fillRef>
+          <a:effectRef idx="0">
+            <a:schemeClr val="accent4"/>
+          </a:effectRef>
+          <a:fontRef idx="minor">
+            <a:schemeClr val="dk1"/>
+          </a:fontRef>
+        </p:style>
+        <p:txBody>
+          <a:bodyPr rtlCol="0" anchor="ctr"/>
+          <a:lstStyle/>
+          <a:p>
+            <a:pPr algn="ctr"/>
+            <a:r>
+              <a:rPr lang="en-US" sz="1600" dirty="0"/>
+              <a:t>Git</a:t>
+            </a:r>
+          </a:p>
+          <a:p>
+            <a:pPr algn="ctr"/>
+            <a:r>
+              <a:rPr lang="en-US" sz="1600" dirty="0"/>
+              <a:t>(version control)</a:t>
+            </a:r>
+            <a:endParaRPr lang="en-IN" sz="1600" dirty="0"/>
+          </a:p>
+        </p:txBody>
+      </p:sp>
+      <p:sp>
+        <p:nvSpPr>
+          <p:cNvPr id="56" name="TextBox 55">
+            <a:extLst>
+              <a:ext uri="{FF2B5EF4-FFF2-40B4-BE49-F238E27FC236}">
+                <a16:creationId xmlns:a16="http://schemas.microsoft.com/office/drawing/2014/main" id="{A1B5FE9F-082C-6C06-9F1B-C1573D476274}"/>
+              </a:ext>
+            </a:extLst>
+          </p:cNvPr>
+          <p:cNvSpPr txBox="1"/>
+          <p:nvPr/>
+        </p:nvSpPr>
+        <p:spPr>
+          <a:xfrm>
+            <a:off x="1243706" y="4078813"/>
+            <a:ext cx="1327518" cy="646331"/>
+          </a:xfrm>
+          <a:prstGeom prst="rect">
+            <a:avLst/>
+          </a:prstGeom>
+          <a:noFill/>
+        </p:spPr>
+        <p:txBody>
+          <a:bodyPr wrap="square" rtlCol="0">
+            <a:spAutoFit/>
+          </a:bodyPr>
+          <a:lstStyle/>
+          <a:p>
+            <a:pPr marL="285750" indent="-285750">
+              <a:buFont typeface="Arial" panose="020B0604020202020204" pitchFamily="34" charset="0"/>
+              <a:buChar char="•"/>
+            </a:pPr>
+            <a:r>
+              <a:rPr lang="en-US" sz="1200" dirty="0"/>
+              <a:t>Sign up</a:t>
+            </a:r>
+          </a:p>
+          <a:p>
+            <a:pPr marL="285750" indent="-285750">
+              <a:buFont typeface="Arial" panose="020B0604020202020204" pitchFamily="34" charset="0"/>
+              <a:buChar char="•"/>
+            </a:pPr>
+            <a:r>
+              <a:rPr lang="en-US" sz="1200" dirty="0"/>
+              <a:t>Login</a:t>
+            </a:r>
+          </a:p>
+          <a:p>
+            <a:pPr marL="285750" indent="-285750">
+              <a:buFont typeface="Arial" panose="020B0604020202020204" pitchFamily="34" charset="0"/>
+              <a:buChar char="•"/>
+            </a:pPr>
+            <a:r>
+              <a:rPr lang="en-US" sz="1200" dirty="0"/>
+              <a:t>Home page</a:t>
+            </a:r>
+            <a:endParaRPr lang="en-IN" sz="1200" dirty="0"/>
+          </a:p>
+        </p:txBody>
+      </p:sp>
+      <p:sp>
+        <p:nvSpPr>
+          <p:cNvPr id="61" name="TextBox 60">
+            <a:extLst>
+              <a:ext uri="{FF2B5EF4-FFF2-40B4-BE49-F238E27FC236}">
+                <a16:creationId xmlns:a16="http://schemas.microsoft.com/office/drawing/2014/main" id="{CAC8B520-C634-B243-23B9-D3ED58327F0B}"/>
+              </a:ext>
+            </a:extLst>
+          </p:cNvPr>
+          <p:cNvSpPr txBox="1"/>
+          <p:nvPr/>
+        </p:nvSpPr>
+        <p:spPr>
+          <a:xfrm>
+            <a:off x="3545632" y="4065179"/>
+            <a:ext cx="2016224" cy="646331"/>
+          </a:xfrm>
+          <a:prstGeom prst="rect">
+            <a:avLst/>
+          </a:prstGeom>
+          <a:noFill/>
+        </p:spPr>
+        <p:txBody>
+          <a:bodyPr wrap="square" rtlCol="0">
+            <a:spAutoFit/>
+          </a:bodyPr>
+          <a:lstStyle/>
+          <a:p>
+            <a:pPr marL="285750" indent="-285750">
+              <a:buFont typeface="Arial" panose="020B0604020202020204" pitchFamily="34" charset="0"/>
+              <a:buChar char="•"/>
+            </a:pPr>
+            <a:r>
+              <a:rPr lang="en-US" sz="1200" dirty="0"/>
+              <a:t>Authentication</a:t>
+            </a:r>
+          </a:p>
+          <a:p>
+            <a:pPr marL="285750" indent="-285750">
+              <a:buFont typeface="Arial" panose="020B0604020202020204" pitchFamily="34" charset="0"/>
+              <a:buChar char="•"/>
+            </a:pPr>
+            <a:r>
+              <a:rPr lang="en-US" sz="1200" dirty="0"/>
+              <a:t>Api end points for check-in</a:t>
+            </a:r>
+            <a:endParaRPr lang="en-IN" sz="1200" dirty="0"/>
+          </a:p>
+        </p:txBody>
+      </p:sp>
+      <p:cxnSp>
+        <p:nvCxnSpPr>
+          <p:cNvPr id="63" name="Connector: Elbow 62">
+            <a:extLst>
+              <a:ext uri="{FF2B5EF4-FFF2-40B4-BE49-F238E27FC236}">
+                <a16:creationId xmlns:a16="http://schemas.microsoft.com/office/drawing/2014/main" id="{D9753895-239F-56A2-5BEC-8BB4F59897BD}"/>
+              </a:ext>
+            </a:extLst>
+          </p:cNvPr>
+          <p:cNvCxnSpPr>
+            <a:stCxn id="11" idx="0"/>
+            <a:endCxn id="51" idx="1"/>
+          </p:cNvCxnSpPr>
+          <p:nvPr/>
+        </p:nvCxnSpPr>
+        <p:spPr>
+          <a:xfrm rot="5400000" flipH="1" flipV="1">
+            <a:off x="1757067" y="2173495"/>
+            <a:ext cx="678827" cy="342528"/>
+          </a:xfrm>
+          <a:prstGeom prst="bentConnector2">
+            <a:avLst/>
+          </a:prstGeom>
+          <a:ln>
+            <a:tailEnd type="triangle"/>
+          </a:ln>
+        </p:spPr>
+        <p:style>
+          <a:lnRef idx="1">
+            <a:schemeClr val="accent1"/>
+          </a:lnRef>
+          <a:fillRef idx="0">
+            <a:schemeClr val="accent1"/>
+          </a:fillRef>
+          <a:effectRef idx="0">
+            <a:schemeClr val="accent1"/>
+          </a:effectRef>
+          <a:fontRef idx="minor">
+            <a:schemeClr val="tx1"/>
+          </a:fontRef>
+        </p:style>
+      </p:cxnSp>
+      <p:cxnSp>
+        <p:nvCxnSpPr>
+          <p:cNvPr id="65" name="Connector: Elbow 64">
+            <a:extLst>
+              <a:ext uri="{FF2B5EF4-FFF2-40B4-BE49-F238E27FC236}">
+                <a16:creationId xmlns:a16="http://schemas.microsoft.com/office/drawing/2014/main" id="{5A804B95-20A7-D605-6D3B-233110F1DB5A}"/>
+              </a:ext>
+            </a:extLst>
+          </p:cNvPr>
+          <p:cNvCxnSpPr>
+            <a:stCxn id="10" idx="0"/>
+            <a:endCxn id="51" idx="3"/>
+          </p:cNvCxnSpPr>
+          <p:nvPr/>
+        </p:nvCxnSpPr>
+        <p:spPr>
+          <a:xfrm rot="16200000" flipV="1">
+            <a:off x="4025795" y="2205781"/>
+            <a:ext cx="678827" cy="277955"/>
+          </a:xfrm>
+          <a:prstGeom prst="bentConnector2">
+            <a:avLst/>
+          </a:prstGeom>
+          <a:ln>
+            <a:tailEnd type="triangle"/>
+          </a:ln>
+        </p:spPr>
+        <p:style>
+          <a:lnRef idx="1">
+            <a:schemeClr val="accent1"/>
+          </a:lnRef>
+          <a:fillRef idx="0">
+            <a:schemeClr val="accent1"/>
+          </a:fillRef>
+          <a:effectRef idx="0">
+            <a:schemeClr val="accent1"/>
+          </a:effectRef>
+          <a:fontRef idx="minor">
+            <a:schemeClr val="tx1"/>
+          </a:fontRef>
+        </p:style>
+      </p:cxnSp>
+      <p:sp>
+        <p:nvSpPr>
+          <p:cNvPr id="66" name="TextBox 65">
+            <a:extLst>
+              <a:ext uri="{FF2B5EF4-FFF2-40B4-BE49-F238E27FC236}">
+                <a16:creationId xmlns:a16="http://schemas.microsoft.com/office/drawing/2014/main" id="{30F8A651-CF77-84A8-329C-D80BBBCA3158}"/>
+              </a:ext>
+            </a:extLst>
+          </p:cNvPr>
+          <p:cNvSpPr txBox="1"/>
+          <p:nvPr/>
+        </p:nvSpPr>
+        <p:spPr>
+          <a:xfrm>
+            <a:off x="6660232" y="4078813"/>
+            <a:ext cx="1080120" cy="461665"/>
+          </a:xfrm>
+          <a:prstGeom prst="rect">
+            <a:avLst/>
+          </a:prstGeom>
+          <a:noFill/>
+        </p:spPr>
+        <p:txBody>
+          <a:bodyPr wrap="square" rtlCol="0">
+            <a:spAutoFit/>
+          </a:bodyPr>
+          <a:lstStyle/>
+          <a:p>
+            <a:pPr marL="171450" indent="-171450">
+              <a:buFont typeface="Arial" panose="020B0604020202020204" pitchFamily="34" charset="0"/>
+              <a:buChar char="•"/>
+            </a:pPr>
+            <a:r>
+              <a:rPr lang="en-US" sz="1200" dirty="0"/>
+              <a:t>User data</a:t>
+            </a:r>
+          </a:p>
+          <a:p>
+            <a:pPr marL="171450" indent="-171450">
+              <a:buFont typeface="Arial" panose="020B0604020202020204" pitchFamily="34" charset="0"/>
+              <a:buChar char="•"/>
+            </a:pPr>
+            <a:r>
+              <a:rPr lang="en-US" sz="1200" dirty="0"/>
+              <a:t>Cart item</a:t>
+            </a:r>
+            <a:endParaRPr lang="en-IN" sz="1200" dirty="0"/>
           </a:p>
         </p:txBody>
       </p:sp>
@@ -11058,7 +11793,7 @@
             </a:pPr>
             <a:fld id="{28EA4A47-561E-465A-A6B1-ADF332ABEB53}" type="datetime5">
               <a:rPr lang="en-US" smtClean="0"/>
-              <a:t>17-Aug-25</a:t>
+              <a:t>18-Aug-25</a:t>
             </a:fld>
             <a:endParaRPr lang="en-US" dirty="0"/>
           </a:p>
@@ -11097,7 +11832,7 @@
             </a:pPr>
             <a:r>
               <a:rPr lang="en-US" b="1" dirty="0"/>
-              <a:t>Implemented (50%)</a:t>
+              <a:t>Implemented (40%)</a:t>
             </a:r>
           </a:p>
           <a:p>
@@ -11326,9 +12061,200 @@
             </a:pPr>
             <a:fld id="{28EA4A47-561E-465A-A6B1-ADF332ABEB53}" type="datetime5">
               <a:rPr lang="en-US" smtClean="0"/>
-              <a:t>17-Aug-25</a:t>
+              <a:t>18-Aug-25</a:t>
             </a:fld>
             <a:endParaRPr lang="en-US" dirty="0"/>
+          </a:p>
+        </p:txBody>
+      </p:sp>
+      <p:pic>
+        <p:nvPicPr>
+          <p:cNvPr id="12" name="Picture 11">
+            <a:extLst>
+              <a:ext uri="{FF2B5EF4-FFF2-40B4-BE49-F238E27FC236}">
+                <a16:creationId xmlns:a16="http://schemas.microsoft.com/office/drawing/2014/main" id="{469D3257-1891-4B98-40A5-F2B50460F04D}"/>
+              </a:ext>
+            </a:extLst>
+          </p:cNvPr>
+          <p:cNvPicPr>
+            <a:picLocks noChangeAspect="1"/>
+          </p:cNvPicPr>
+          <p:nvPr/>
+        </p:nvPicPr>
+        <p:blipFill>
+          <a:blip r:embed="rId2" cstate="print">
+            <a:extLst>
+              <a:ext uri="{28A0092B-C50C-407E-A947-70E740481C1C}">
+                <a14:useLocalDpi xmlns:a14="http://schemas.microsoft.com/office/drawing/2010/main" val="0"/>
+              </a:ext>
+            </a:extLst>
+          </a:blip>
+          <a:stretch>
+            <a:fillRect/>
+          </a:stretch>
+        </p:blipFill>
+        <p:spPr>
+          <a:xfrm>
+            <a:off x="827584" y="2348880"/>
+            <a:ext cx="3923928" cy="3670022"/>
+          </a:xfrm>
+          <a:prstGeom prst="rect">
+            <a:avLst/>
+          </a:prstGeom>
+        </p:spPr>
+      </p:pic>
+      <p:pic>
+        <p:nvPicPr>
+          <p:cNvPr id="20" name="Picture 19">
+            <a:extLst>
+              <a:ext uri="{FF2B5EF4-FFF2-40B4-BE49-F238E27FC236}">
+                <a16:creationId xmlns:a16="http://schemas.microsoft.com/office/drawing/2014/main" id="{20B2BD47-EA21-1FB1-9EFB-DBA9F7E5AC21}"/>
+              </a:ext>
+            </a:extLst>
+          </p:cNvPr>
+          <p:cNvPicPr>
+            <a:picLocks noChangeAspect="1"/>
+          </p:cNvPicPr>
+          <p:nvPr/>
+        </p:nvPicPr>
+        <p:blipFill>
+          <a:blip r:embed="rId3" cstate="print">
+            <a:extLst>
+              <a:ext uri="{28A0092B-C50C-407E-A947-70E740481C1C}">
+                <a14:useLocalDpi xmlns:a14="http://schemas.microsoft.com/office/drawing/2010/main" val="0"/>
+              </a:ext>
+            </a:extLst>
+          </a:blip>
+          <a:stretch>
+            <a:fillRect/>
+          </a:stretch>
+        </p:blipFill>
+        <p:spPr>
+          <a:xfrm>
+            <a:off x="4932040" y="2348880"/>
+            <a:ext cx="3923928" cy="3670021"/>
+          </a:xfrm>
+          <a:prstGeom prst="rect">
+            <a:avLst/>
+          </a:prstGeom>
+        </p:spPr>
+      </p:pic>
+      <p:sp>
+        <p:nvSpPr>
+          <p:cNvPr id="22" name="TextBox 21">
+            <a:extLst>
+              <a:ext uri="{FF2B5EF4-FFF2-40B4-BE49-F238E27FC236}">
+                <a16:creationId xmlns:a16="http://schemas.microsoft.com/office/drawing/2014/main" id="{79D3E11D-4BD0-651C-755C-62E7A63398A5}"/>
+              </a:ext>
+            </a:extLst>
+          </p:cNvPr>
+          <p:cNvSpPr txBox="1"/>
+          <p:nvPr/>
+        </p:nvSpPr>
+        <p:spPr>
+          <a:xfrm>
+            <a:off x="2345317" y="548680"/>
+            <a:ext cx="4572000" cy="707886"/>
+          </a:xfrm>
+          <a:prstGeom prst="rect">
+            <a:avLst/>
+          </a:prstGeom>
+          <a:noFill/>
+        </p:spPr>
+        <p:txBody>
+          <a:bodyPr wrap="square">
+            <a:spAutoFit/>
+          </a:bodyPr>
+          <a:lstStyle/>
+          <a:p>
+            <a:pPr algn="ctr">
+              <a:buNone/>
+            </a:pPr>
+            <a:r>
+              <a:rPr lang="en-US" sz="4000" b="1" dirty="0">
+                <a:solidFill>
+                  <a:srgbClr val="0000FF"/>
+                </a:solidFill>
+              </a:rPr>
+              <a:t>Output</a:t>
+            </a:r>
+          </a:p>
+        </p:txBody>
+      </p:sp>
+      <p:sp>
+        <p:nvSpPr>
+          <p:cNvPr id="24" name="TextBox 23">
+            <a:extLst>
+              <a:ext uri="{FF2B5EF4-FFF2-40B4-BE49-F238E27FC236}">
+                <a16:creationId xmlns:a16="http://schemas.microsoft.com/office/drawing/2014/main" id="{878121D6-304C-4CCE-B4C8-7191626CB574}"/>
+              </a:ext>
+            </a:extLst>
+          </p:cNvPr>
+          <p:cNvSpPr txBox="1"/>
+          <p:nvPr/>
+        </p:nvSpPr>
+        <p:spPr>
+          <a:xfrm>
+            <a:off x="457200" y="1916832"/>
+            <a:ext cx="4572000" cy="369332"/>
+          </a:xfrm>
+          <a:prstGeom prst="rect">
+            <a:avLst/>
+          </a:prstGeom>
+          <a:noFill/>
+        </p:spPr>
+        <p:txBody>
+          <a:bodyPr wrap="square">
+            <a:spAutoFit/>
+          </a:bodyPr>
+          <a:lstStyle/>
+          <a:p>
+            <a:pPr algn="ctr">
+              <a:buNone/>
+            </a:pPr>
+            <a:r>
+              <a:rPr lang="en-US" b="1" dirty="0"/>
+              <a:t>User dashboard</a:t>
+            </a:r>
+            <a:endParaRPr lang="en-US" sz="1800" b="1" dirty="0"/>
+          </a:p>
+        </p:txBody>
+      </p:sp>
+      <p:sp>
+        <p:nvSpPr>
+          <p:cNvPr id="26" name="TextBox 25">
+            <a:extLst>
+              <a:ext uri="{FF2B5EF4-FFF2-40B4-BE49-F238E27FC236}">
+                <a16:creationId xmlns:a16="http://schemas.microsoft.com/office/drawing/2014/main" id="{9613EC0B-4518-7D14-1AAE-98A217BA3141}"/>
+              </a:ext>
+            </a:extLst>
+          </p:cNvPr>
+          <p:cNvSpPr txBox="1"/>
+          <p:nvPr/>
+        </p:nvSpPr>
+        <p:spPr>
+          <a:xfrm>
+            <a:off x="4499992" y="1900890"/>
+            <a:ext cx="4572000" cy="369332"/>
+          </a:xfrm>
+          <a:prstGeom prst="rect">
+            <a:avLst/>
+          </a:prstGeom>
+          <a:noFill/>
+        </p:spPr>
+        <p:txBody>
+          <a:bodyPr wrap="square">
+            <a:spAutoFit/>
+          </a:bodyPr>
+          <a:lstStyle/>
+          <a:p>
+            <a:pPr algn="ctr">
+              <a:buNone/>
+            </a:pPr>
+            <a:r>
+              <a:rPr lang="en-US" sz="1800" b="1" dirty="0"/>
+              <a:t>Popular dishes</a:t>
+            </a:r>
           </a:p>
         </p:txBody>
       </p:sp>
@@ -11367,7 +12293,7 @@
           <p:cNvPr id="2" name="Date Placeholder 1">
             <a:extLst>
               <a:ext uri="{FF2B5EF4-FFF2-40B4-BE49-F238E27FC236}">
-                <a16:creationId xmlns:a16="http://schemas.microsoft.com/office/drawing/2014/main" id="{84515E7A-2BC2-A700-AFFF-5C3D59017AFE}"/>
+                <a16:creationId xmlns:a16="http://schemas.microsoft.com/office/drawing/2014/main" id="{2B8D7634-0A2C-FB03-9BA8-A1BED1482F98}"/>
               </a:ext>
             </a:extLst>
           </p:cNvPr>
@@ -11388,16 +12314,165 @@
             </a:pPr>
             <a:fld id="{28EA4A47-561E-465A-A6B1-ADF332ABEB53}" type="datetime5">
               <a:rPr lang="en-US" smtClean="0"/>
-              <a:t>17-Aug-25</a:t>
+              <a:t>18-Aug-25</a:t>
             </a:fld>
             <a:endParaRPr lang="en-US" dirty="0"/>
+          </a:p>
+        </p:txBody>
+      </p:sp>
+      <p:pic>
+        <p:nvPicPr>
+          <p:cNvPr id="4" name="Picture 3">
+            <a:extLst>
+              <a:ext uri="{FF2B5EF4-FFF2-40B4-BE49-F238E27FC236}">
+                <a16:creationId xmlns:a16="http://schemas.microsoft.com/office/drawing/2014/main" id="{F7F33998-C8E6-6016-8487-4B18BE4B7E0E}"/>
+              </a:ext>
+            </a:extLst>
+          </p:cNvPr>
+          <p:cNvPicPr>
+            <a:picLocks noChangeAspect="1"/>
+          </p:cNvPicPr>
+          <p:nvPr/>
+        </p:nvPicPr>
+        <p:blipFill>
+          <a:blip r:embed="rId2" cstate="print">
+            <a:extLst>
+              <a:ext uri="{28A0092B-C50C-407E-A947-70E740481C1C}">
+                <a14:useLocalDpi xmlns:a14="http://schemas.microsoft.com/office/drawing/2010/main" val="0"/>
+              </a:ext>
+            </a:extLst>
+          </a:blip>
+          <a:stretch>
+            <a:fillRect/>
+          </a:stretch>
+        </p:blipFill>
+        <p:spPr>
+          <a:xfrm>
+            <a:off x="971600" y="2348880"/>
+            <a:ext cx="3816424" cy="3587968"/>
+          </a:xfrm>
+          <a:prstGeom prst="rect">
+            <a:avLst/>
+          </a:prstGeom>
+        </p:spPr>
+      </p:pic>
+      <p:pic>
+        <p:nvPicPr>
+          <p:cNvPr id="6" name="Picture 5">
+            <a:extLst>
+              <a:ext uri="{FF2B5EF4-FFF2-40B4-BE49-F238E27FC236}">
+                <a16:creationId xmlns:a16="http://schemas.microsoft.com/office/drawing/2014/main" id="{4D55B5A5-952B-2EE5-CFDC-C67A5DA71381}"/>
+              </a:ext>
+            </a:extLst>
+          </p:cNvPr>
+          <p:cNvPicPr>
+            <a:picLocks noChangeAspect="1"/>
+          </p:cNvPicPr>
+          <p:nvPr/>
+        </p:nvPicPr>
+        <p:blipFill>
+          <a:blip r:embed="rId3" cstate="print">
+            <a:extLst>
+              <a:ext uri="{28A0092B-C50C-407E-A947-70E740481C1C}">
+                <a14:useLocalDpi xmlns:a14="http://schemas.microsoft.com/office/drawing/2010/main" val="0"/>
+              </a:ext>
+            </a:extLst>
+          </a:blip>
+          <a:stretch>
+            <a:fillRect/>
+          </a:stretch>
+        </p:blipFill>
+        <p:spPr>
+          <a:xfrm>
+            <a:off x="5098130" y="2348880"/>
+            <a:ext cx="3851920" cy="3587968"/>
+          </a:xfrm>
+          <a:prstGeom prst="rect">
+            <a:avLst/>
+          </a:prstGeom>
+        </p:spPr>
+      </p:pic>
+      <p:sp>
+        <p:nvSpPr>
+          <p:cNvPr id="10" name="TextBox 9">
+            <a:extLst>
+              <a:ext uri="{FF2B5EF4-FFF2-40B4-BE49-F238E27FC236}">
+                <a16:creationId xmlns:a16="http://schemas.microsoft.com/office/drawing/2014/main" id="{FCB557B7-9441-EFCB-F014-76EB30BA4183}"/>
+              </a:ext>
+            </a:extLst>
+          </p:cNvPr>
+          <p:cNvSpPr txBox="1"/>
+          <p:nvPr/>
+        </p:nvSpPr>
+        <p:spPr>
+          <a:xfrm>
+            <a:off x="526130" y="1560046"/>
+            <a:ext cx="4572000" cy="369332"/>
+          </a:xfrm>
+          <a:prstGeom prst="rect">
+            <a:avLst/>
+          </a:prstGeom>
+          <a:noFill/>
+        </p:spPr>
+        <p:txBody>
+          <a:bodyPr wrap="square">
+            <a:spAutoFit/>
+          </a:bodyPr>
+          <a:lstStyle/>
+          <a:p>
+            <a:pPr algn="ctr">
+              <a:buNone/>
+            </a:pPr>
+            <a:r>
+              <a:rPr lang="en-US" sz="1800" b="1" dirty="0"/>
+              <a:t>Sign up page</a:t>
+            </a:r>
+          </a:p>
+        </p:txBody>
+      </p:sp>
+      <p:sp>
+        <p:nvSpPr>
+          <p:cNvPr id="12" name="TextBox 11">
+            <a:extLst>
+              <a:ext uri="{FF2B5EF4-FFF2-40B4-BE49-F238E27FC236}">
+                <a16:creationId xmlns:a16="http://schemas.microsoft.com/office/drawing/2014/main" id="{757B5E93-8C8D-3FB0-D172-735315DA8482}"/>
+              </a:ext>
+            </a:extLst>
+          </p:cNvPr>
+          <p:cNvSpPr txBox="1"/>
+          <p:nvPr/>
+        </p:nvSpPr>
+        <p:spPr>
+          <a:xfrm>
+            <a:off x="4752528" y="1560046"/>
+            <a:ext cx="4572000" cy="369332"/>
+          </a:xfrm>
+          <a:prstGeom prst="rect">
+            <a:avLst/>
+          </a:prstGeom>
+          <a:noFill/>
+        </p:spPr>
+        <p:txBody>
+          <a:bodyPr wrap="square">
+            <a:spAutoFit/>
+          </a:bodyPr>
+          <a:lstStyle/>
+          <a:p>
+            <a:pPr algn="ctr">
+              <a:buNone/>
+            </a:pPr>
+            <a:r>
+              <a:rPr lang="en-US" b="1" dirty="0"/>
+              <a:t>Login page</a:t>
+            </a:r>
+            <a:endParaRPr lang="en-US" sz="1800" b="1" dirty="0"/>
           </a:p>
         </p:txBody>
       </p:sp>
     </p:spTree>
     <p:extLst>
       <p:ext uri="{BB962C8B-B14F-4D97-AF65-F5344CB8AC3E}">
-        <p14:creationId xmlns:p14="http://schemas.microsoft.com/office/powerpoint/2010/main" val="4030882207"/>
+        <p14:creationId xmlns:p14="http://schemas.microsoft.com/office/powerpoint/2010/main" val="4052785481"/>
       </p:ext>
     </p:extLst>
   </p:cSld>
@@ -11429,7 +12504,7 @@
           <p:cNvPr id="2" name="Date Placeholder 1">
             <a:extLst>
               <a:ext uri="{FF2B5EF4-FFF2-40B4-BE49-F238E27FC236}">
-                <a16:creationId xmlns:a16="http://schemas.microsoft.com/office/drawing/2014/main" id="{C8B5DC36-E94B-19D6-8BC1-890B6DF2665C}"/>
+                <a16:creationId xmlns:a16="http://schemas.microsoft.com/office/drawing/2014/main" id="{84515E7A-2BC2-A700-AFFF-5C3D59017AFE}"/>
               </a:ext>
             </a:extLst>
           </p:cNvPr>
@@ -11450,18 +12525,84 @@
             </a:pPr>
             <a:fld id="{28EA4A47-561E-465A-A6B1-ADF332ABEB53}" type="datetime5">
               <a:rPr lang="en-US" smtClean="0"/>
-              <a:t>17-Aug-25</a:t>
+              <a:t>18-Aug-25</a:t>
             </a:fld>
             <a:endParaRPr lang="en-US" dirty="0"/>
           </a:p>
         </p:txBody>
       </p:sp>
-      <p:sp>
-        <p:nvSpPr>
-          <p:cNvPr id="4" name="TextBox 3">
+      <p:pic>
+        <p:nvPicPr>
+          <p:cNvPr id="4" name="Picture 3">
             <a:extLst>
               <a:ext uri="{FF2B5EF4-FFF2-40B4-BE49-F238E27FC236}">
-                <a16:creationId xmlns:a16="http://schemas.microsoft.com/office/drawing/2014/main" id="{F932F2F5-862E-39B0-CB5A-37F5D67A22D0}"/>
+                <a16:creationId xmlns:a16="http://schemas.microsoft.com/office/drawing/2014/main" id="{2373ECB3-B745-DA6A-8B65-ADF7DB867220}"/>
+              </a:ext>
+            </a:extLst>
+          </p:cNvPr>
+          <p:cNvPicPr>
+            <a:picLocks noChangeAspect="1"/>
+          </p:cNvPicPr>
+          <p:nvPr/>
+        </p:nvPicPr>
+        <p:blipFill>
+          <a:blip r:embed="rId2"/>
+          <a:stretch>
+            <a:fillRect/>
+          </a:stretch>
+        </p:blipFill>
+        <p:spPr>
+          <a:xfrm>
+            <a:off x="5292080" y="2132855"/>
+            <a:ext cx="3635896" cy="3749295"/>
+          </a:xfrm>
+          <a:prstGeom prst="rect">
+            <a:avLst/>
+          </a:prstGeom>
+        </p:spPr>
+      </p:pic>
+      <p:pic>
+        <p:nvPicPr>
+          <p:cNvPr id="6" name="Picture 5">
+            <a:extLst>
+              <a:ext uri="{FF2B5EF4-FFF2-40B4-BE49-F238E27FC236}">
+                <a16:creationId xmlns:a16="http://schemas.microsoft.com/office/drawing/2014/main" id="{57B4CFA9-596F-1F33-48F9-07113B940B3D}"/>
+              </a:ext>
+            </a:extLst>
+          </p:cNvPr>
+          <p:cNvPicPr>
+            <a:picLocks noChangeAspect="1"/>
+          </p:cNvPicPr>
+          <p:nvPr/>
+        </p:nvPicPr>
+        <p:blipFill>
+          <a:blip r:embed="rId3" cstate="print">
+            <a:extLst>
+              <a:ext uri="{28A0092B-C50C-407E-A947-70E740481C1C}">
+                <a14:useLocalDpi xmlns:a14="http://schemas.microsoft.com/office/drawing/2010/main" val="0"/>
+              </a:ext>
+            </a:extLst>
+          </a:blip>
+          <a:stretch>
+            <a:fillRect/>
+          </a:stretch>
+        </p:blipFill>
+        <p:spPr>
+          <a:xfrm>
+            <a:off x="1080120" y="2132855"/>
+            <a:ext cx="3563888" cy="3749295"/>
+          </a:xfrm>
+          <a:prstGeom prst="rect">
+            <a:avLst/>
+          </a:prstGeom>
+        </p:spPr>
+      </p:pic>
+      <p:sp>
+        <p:nvSpPr>
+          <p:cNvPr id="8" name="TextBox 7">
+            <a:extLst>
+              <a:ext uri="{FF2B5EF4-FFF2-40B4-BE49-F238E27FC236}">
+                <a16:creationId xmlns:a16="http://schemas.microsoft.com/office/drawing/2014/main" id="{646F8089-2F3D-B787-94B9-DBD16B349CC3}"/>
               </a:ext>
             </a:extLst>
           </p:cNvPr>
@@ -11470,8 +12611,8 @@
         </p:nvSpPr>
         <p:spPr>
           <a:xfrm>
-            <a:off x="1405473" y="1485939"/>
-            <a:ext cx="6910943" cy="3416320"/>
+            <a:off x="576064" y="1382688"/>
+            <a:ext cx="4572000" cy="369332"/>
           </a:xfrm>
           <a:prstGeom prst="rect">
             <a:avLst/>
@@ -11484,77 +12625,23 @@
           </a:bodyPr>
           <a:lstStyle/>
           <a:p>
-            <a:pPr marL="285750" indent="-285750">
-              <a:buFont typeface="Arial" panose="020B0604020202020204" pitchFamily="34" charset="0"/>
-              <a:buChar char="•"/>
+            <a:pPr algn="ctr">
+              <a:buNone/>
             </a:pPr>
             <a:r>
               <a:rPr lang="en-US" b="1" dirty="0"/>
-              <a:t>kaushikjadhav01 / Online-Food-Ordering-Web-App</a:t>
-            </a:r>
-            <a:br>
-              <a:rPr lang="en-US" dirty="0"/>
-            </a:br>
-            <a:r>
-              <a:rPr lang="en-US" dirty="0"/>
-              <a:t>	A widely-used implementation of an online food ordering system built using</a:t>
-            </a:r>
-            <a:r>
-              <a:rPr lang="en-US" b="1" dirty="0"/>
-              <a:t> PHP, MySQL, HTML, CSS, and JS</a:t>
-            </a:r>
-            <a:r>
-              <a:rPr lang="en-US" dirty="0"/>
-              <a:t>, complete with admin and user roles. Highly practical for full-stack architecture inspiration.</a:t>
-            </a:r>
-          </a:p>
-          <a:p>
-            <a:endParaRPr lang="en-US" dirty="0"/>
-          </a:p>
-          <a:p>
-            <a:pPr marL="285750" indent="-285750">
-              <a:buFont typeface="Arial" panose="020B0604020202020204" pitchFamily="34" charset="0"/>
-              <a:buChar char="•"/>
-            </a:pPr>
-            <a:r>
-              <a:rPr lang="en-IN" b="1" dirty="0" err="1"/>
-              <a:t>nikulram</a:t>
-            </a:r>
-            <a:r>
-              <a:rPr lang="en-IN" b="1" dirty="0"/>
-              <a:t> / Online-Food-Ordering-System</a:t>
-            </a:r>
-            <a:br>
-              <a:rPr lang="en-IN" dirty="0"/>
-            </a:br>
-            <a:r>
-              <a:rPr lang="en-IN" dirty="0"/>
-              <a:t>	A clean and functional platform using </a:t>
-            </a:r>
-            <a:r>
-              <a:rPr lang="en-IN" b="1" dirty="0"/>
-              <a:t>PHP and MySQL</a:t>
-            </a:r>
-            <a:r>
-              <a:rPr lang="en-IN" dirty="0"/>
-              <a:t>, covering features like menu browsing, cart, checkout, order history, and admin menu &amp; user management. Excellent for core functionality reference.</a:t>
-            </a:r>
-          </a:p>
-          <a:p>
-            <a:pPr marL="285750" indent="-285750">
-              <a:buFont typeface="Arial" panose="020B0604020202020204" pitchFamily="34" charset="0"/>
-              <a:buChar char="•"/>
-            </a:pPr>
-            <a:endParaRPr lang="en-IN" dirty="0"/>
-          </a:p>
-        </p:txBody>
-      </p:sp>
-      <p:sp>
-        <p:nvSpPr>
-          <p:cNvPr id="8" name="TextBox 7">
+              <a:t>Login type</a:t>
+            </a:r>
+            <a:endParaRPr lang="en-US" sz="1800" b="1" dirty="0"/>
+          </a:p>
+        </p:txBody>
+      </p:sp>
+      <p:sp>
+        <p:nvSpPr>
+          <p:cNvPr id="10" name="TextBox 9">
             <a:extLst>
               <a:ext uri="{FF2B5EF4-FFF2-40B4-BE49-F238E27FC236}">
-                <a16:creationId xmlns:a16="http://schemas.microsoft.com/office/drawing/2014/main" id="{60965D78-779B-B176-4017-DBCA9B83CA30}"/>
+                <a16:creationId xmlns:a16="http://schemas.microsoft.com/office/drawing/2014/main" id="{AF00193D-DE88-5B35-290C-D7FD8861AA8D}"/>
               </a:ext>
             </a:extLst>
           </p:cNvPr>
@@ -11563,8 +12650,8 @@
         </p:nvSpPr>
         <p:spPr>
           <a:xfrm>
-            <a:off x="2411760" y="480052"/>
-            <a:ext cx="4572000" cy="707886"/>
+            <a:off x="4932040" y="1382688"/>
+            <a:ext cx="4572000" cy="369332"/>
           </a:xfrm>
           <a:prstGeom prst="rect">
             <a:avLst/>
@@ -11581,25 +12668,17 @@
               <a:buNone/>
             </a:pPr>
             <a:r>
-              <a:rPr lang="en-IN" sz="4000" dirty="0">
-                <a:solidFill>
-                  <a:srgbClr val="0000FF"/>
-                </a:solidFill>
-              </a:rPr>
-              <a:t>References</a:t>
-            </a:r>
-            <a:endParaRPr lang="en-US" sz="4000" b="1" dirty="0">
-              <a:solidFill>
-                <a:srgbClr val="0000FF"/>
-              </a:solidFill>
-            </a:endParaRPr>
+              <a:rPr lang="en-US" b="1" dirty="0"/>
+              <a:t>Cart</a:t>
+            </a:r>
+            <a:endParaRPr lang="en-US" sz="1800" b="1" dirty="0"/>
           </a:p>
         </p:txBody>
       </p:sp>
     </p:spTree>
     <p:extLst>
       <p:ext uri="{BB962C8B-B14F-4D97-AF65-F5344CB8AC3E}">
-        <p14:creationId xmlns:p14="http://schemas.microsoft.com/office/powerpoint/2010/main" val="2429047091"/>
+        <p14:creationId xmlns:p14="http://schemas.microsoft.com/office/powerpoint/2010/main" val="4030882207"/>
       </p:ext>
     </p:extLst>
   </p:cSld>
@@ -11628,51 +12707,13 @@
       </p:grpSpPr>
       <p:sp>
         <p:nvSpPr>
-          <p:cNvPr id="3" name="Content Placeholder 2"/>
-          <p:cNvSpPr>
-            <a:spLocks noGrp="1"/>
-          </p:cNvSpPr>
-          <p:nvPr>
-            <p:ph idx="1"/>
-          </p:nvPr>
-        </p:nvSpPr>
-        <p:spPr>
-          <a:xfrm>
-            <a:off x="899592" y="2708920"/>
-            <a:ext cx="7787208" cy="1152128"/>
-          </a:xfrm>
-        </p:spPr>
-        <p:txBody>
-          <a:bodyPr/>
-          <a:lstStyle/>
-          <a:p>
-            <a:pPr marL="0" indent="0" algn="ctr">
-              <a:buNone/>
-            </a:pPr>
-            <a:r>
-              <a:rPr lang="en-IN" sz="6600" b="1" dirty="0">
-                <a:solidFill>
-                  <a:srgbClr val="FF0000"/>
-                </a:solidFill>
-                <a:latin typeface="Times New Roman" panose="02020603050405020304" pitchFamily="18" charset="0"/>
-                <a:ea typeface="Cambria" panose="02040503050406030204" pitchFamily="18" charset="0"/>
-                <a:cs typeface="Times New Roman" panose="02020603050405020304" pitchFamily="18" charset="0"/>
-              </a:rPr>
-              <a:t>Thank You !!</a:t>
-            </a:r>
-            <a:endParaRPr lang="en-US" sz="6600" b="1" dirty="0">
-              <a:solidFill>
-                <a:srgbClr val="FF0000"/>
-              </a:solidFill>
-              <a:latin typeface="Times New Roman" panose="02020603050405020304" pitchFamily="18" charset="0"/>
-              <a:cs typeface="Times New Roman" panose="02020603050405020304" pitchFamily="18" charset="0"/>
-            </a:endParaRPr>
-          </a:p>
-        </p:txBody>
-      </p:sp>
-      <p:sp>
-        <p:nvSpPr>
-          <p:cNvPr id="4" name="Date Placeholder 3"/>
+          <p:cNvPr id="2" name="Date Placeholder 1">
+            <a:extLst>
+              <a:ext uri="{FF2B5EF4-FFF2-40B4-BE49-F238E27FC236}">
+                <a16:creationId xmlns:a16="http://schemas.microsoft.com/office/drawing/2014/main" id="{C8B5DC36-E94B-19D6-8BC1-890B6DF2665C}"/>
+              </a:ext>
+            </a:extLst>
+          </p:cNvPr>
           <p:cNvSpPr>
             <a:spLocks noGrp="1"/>
           </p:cNvSpPr>
@@ -11688,39 +12729,160 @@
             <a:pPr>
               <a:defRPr/>
             </a:pPr>
-            <a:fld id="{E1413D5B-0279-47B2-AB44-E806A00ECAC5}" type="datetime5">
+            <a:fld id="{28EA4A47-561E-465A-A6B1-ADF332ABEB53}" type="datetime5">
               <a:rPr lang="en-US" smtClean="0"/>
-              <a:t>17-Aug-25</a:t>
+              <a:t>18-Aug-25</a:t>
             </a:fld>
             <a:endParaRPr lang="en-US" dirty="0"/>
           </a:p>
         </p:txBody>
       </p:sp>
-      <p:pic>
-        <p:nvPicPr>
-          <p:cNvPr id="5" name="Picture 4" descr="kec2blackborder png.PNG"/>
-          <p:cNvPicPr>
-            <a:picLocks noChangeAspect="1"/>
-          </p:cNvPicPr>
+      <p:sp>
+        <p:nvSpPr>
+          <p:cNvPr id="4" name="TextBox 3">
+            <a:extLst>
+              <a:ext uri="{FF2B5EF4-FFF2-40B4-BE49-F238E27FC236}">
+                <a16:creationId xmlns:a16="http://schemas.microsoft.com/office/drawing/2014/main" id="{F932F2F5-862E-39B0-CB5A-37F5D67A22D0}"/>
+              </a:ext>
+            </a:extLst>
+          </p:cNvPr>
+          <p:cNvSpPr txBox="1"/>
           <p:nvPr/>
-        </p:nvPicPr>
-        <p:blipFill>
-          <a:blip r:embed="rId2" cstate="print"/>
-          <a:stretch>
-            <a:fillRect/>
-          </a:stretch>
-        </p:blipFill>
+        </p:nvSpPr>
         <p:spPr>
           <a:xfrm>
-            <a:off x="0" y="52612"/>
-            <a:ext cx="508210" cy="632726"/>
+            <a:off x="1405473" y="1485939"/>
+            <a:ext cx="6910943" cy="3416320"/>
           </a:xfrm>
           <a:prstGeom prst="rect">
             <a:avLst/>
           </a:prstGeom>
-        </p:spPr>
-      </p:pic>
+          <a:noFill/>
+        </p:spPr>
+        <p:txBody>
+          <a:bodyPr wrap="square">
+            <a:spAutoFit/>
+          </a:bodyPr>
+          <a:lstStyle/>
+          <a:p>
+            <a:pPr marL="285750" indent="-285750">
+              <a:buFont typeface="Arial" panose="020B0604020202020204" pitchFamily="34" charset="0"/>
+              <a:buChar char="•"/>
+            </a:pPr>
+            <a:r>
+              <a:rPr lang="en-US" b="1" dirty="0"/>
+              <a:t>kaushikjadhav01 / Online-Food-Ordering-Web-App</a:t>
+            </a:r>
+            <a:br>
+              <a:rPr lang="en-US" dirty="0"/>
+            </a:br>
+            <a:r>
+              <a:rPr lang="en-US" dirty="0"/>
+              <a:t>	A widely-used implementation of an online food ordering system built using</a:t>
+            </a:r>
+            <a:r>
+              <a:rPr lang="en-US" b="1" dirty="0"/>
+              <a:t> PHP, MySQL, HTML, CSS, and JS</a:t>
+            </a:r>
+            <a:r>
+              <a:rPr lang="en-US" dirty="0"/>
+              <a:t>, complete with admin and user roles. Highly practical for full-stack architecture inspiration.</a:t>
+            </a:r>
+          </a:p>
+          <a:p>
+            <a:endParaRPr lang="en-US" dirty="0"/>
+          </a:p>
+          <a:p>
+            <a:pPr marL="285750" indent="-285750">
+              <a:buFont typeface="Arial" panose="020B0604020202020204" pitchFamily="34" charset="0"/>
+              <a:buChar char="•"/>
+            </a:pPr>
+            <a:r>
+              <a:rPr lang="en-IN" b="1" dirty="0" err="1"/>
+              <a:t>nikulram</a:t>
+            </a:r>
+            <a:r>
+              <a:rPr lang="en-IN" b="1" dirty="0"/>
+              <a:t> / Online-Food-Ordering-System</a:t>
+            </a:r>
+            <a:br>
+              <a:rPr lang="en-IN" dirty="0"/>
+            </a:br>
+            <a:r>
+              <a:rPr lang="en-IN" dirty="0"/>
+              <a:t>	A clean and functional platform using </a:t>
+            </a:r>
+            <a:r>
+              <a:rPr lang="en-IN" b="1" dirty="0"/>
+              <a:t>PHP and MySQL</a:t>
+            </a:r>
+            <a:r>
+              <a:rPr lang="en-IN" dirty="0"/>
+              <a:t>, covering features like menu browsing, cart, checkout, order history, and admin menu &amp; user management. Excellent for core functionality reference.</a:t>
+            </a:r>
+          </a:p>
+          <a:p>
+            <a:pPr marL="285750" indent="-285750">
+              <a:buFont typeface="Arial" panose="020B0604020202020204" pitchFamily="34" charset="0"/>
+              <a:buChar char="•"/>
+            </a:pPr>
+            <a:endParaRPr lang="en-IN" dirty="0"/>
+          </a:p>
+        </p:txBody>
+      </p:sp>
+      <p:sp>
+        <p:nvSpPr>
+          <p:cNvPr id="8" name="TextBox 7">
+            <a:extLst>
+              <a:ext uri="{FF2B5EF4-FFF2-40B4-BE49-F238E27FC236}">
+                <a16:creationId xmlns:a16="http://schemas.microsoft.com/office/drawing/2014/main" id="{60965D78-779B-B176-4017-DBCA9B83CA30}"/>
+              </a:ext>
+            </a:extLst>
+          </p:cNvPr>
+          <p:cNvSpPr txBox="1"/>
+          <p:nvPr/>
+        </p:nvSpPr>
+        <p:spPr>
+          <a:xfrm>
+            <a:off x="2411760" y="480052"/>
+            <a:ext cx="4572000" cy="707886"/>
+          </a:xfrm>
+          <a:prstGeom prst="rect">
+            <a:avLst/>
+          </a:prstGeom>
+          <a:noFill/>
+        </p:spPr>
+        <p:txBody>
+          <a:bodyPr wrap="square">
+            <a:spAutoFit/>
+          </a:bodyPr>
+          <a:lstStyle/>
+          <a:p>
+            <a:pPr algn="ctr">
+              <a:buNone/>
+            </a:pPr>
+            <a:r>
+              <a:rPr lang="en-IN" sz="4000" dirty="0">
+                <a:solidFill>
+                  <a:srgbClr val="0000FF"/>
+                </a:solidFill>
+              </a:rPr>
+              <a:t>References</a:t>
+            </a:r>
+            <a:endParaRPr lang="en-US" sz="4000" b="1" dirty="0">
+              <a:solidFill>
+                <a:srgbClr val="0000FF"/>
+              </a:solidFill>
+            </a:endParaRPr>
+          </a:p>
+        </p:txBody>
+      </p:sp>
     </p:spTree>
+    <p:extLst>
+      <p:ext uri="{BB962C8B-B14F-4D97-AF65-F5344CB8AC3E}">
+        <p14:creationId xmlns:p14="http://schemas.microsoft.com/office/powerpoint/2010/main" val="2429047091"/>
+      </p:ext>
+    </p:extLst>
   </p:cSld>
   <p:clrMapOvr>
     <a:masterClrMapping/>

</xml_diff>